<commit_message>
readded tasks.xlsx changed präsi
</commit_message>
<xml_diff>
--- a/ch.bfh.bti7054.w2014.p.pc-hammer/doc/PCHAMMER.pptx
+++ b/ch.bfh.bti7054.w2014.p.pc-hammer/doc/PCHAMMER.pptx
@@ -6,10 +6,12 @@
   </p:sldMasterIdLst>
   <p:sldIdLst>
     <p:sldId id="256" r:id="rId2"/>
-    <p:sldId id="257" r:id="rId3"/>
-    <p:sldId id="258" r:id="rId4"/>
-    <p:sldId id="259" r:id="rId5"/>
-    <p:sldId id="260" r:id="rId6"/>
+    <p:sldId id="261" r:id="rId3"/>
+    <p:sldId id="257" r:id="rId4"/>
+    <p:sldId id="258" r:id="rId5"/>
+    <p:sldId id="262" r:id="rId6"/>
+    <p:sldId id="259" r:id="rId7"/>
+    <p:sldId id="260" r:id="rId8"/>
   </p:sldIdLst>
   <p:sldSz cx="12192000" cy="6858000"/>
   <p:notesSz cx="6858000" cy="9144000"/>
@@ -3027,29 +3029,29 @@
           <a:bodyPr/>
           <a:lstStyle/>
           <a:p>
+            <a:endParaRPr lang="de-CH" dirty="0"/>
+          </a:p>
+        </p:txBody>
+      </p:sp>
+      <p:sp>
+        <p:nvSpPr>
+          <p:cNvPr id="3" name="Subtitle 2"/>
+          <p:cNvSpPr>
+            <a:spLocks noGrp="1"/>
+          </p:cNvSpPr>
+          <p:nvPr>
+            <p:ph type="subTitle" idx="1"/>
+          </p:nvPr>
+        </p:nvSpPr>
+        <p:spPr/>
+        <p:txBody>
+          <a:bodyPr/>
+          <a:lstStyle/>
+          <a:p>
             <a:r>
               <a:rPr lang="de-CH" dirty="0" smtClean="0"/>
-              <a:t>PCHAMMER</a:t>
-            </a:r>
-            <a:endParaRPr lang="de-CH" dirty="0"/>
-          </a:p>
-        </p:txBody>
-      </p:sp>
-      <p:sp>
-        <p:nvSpPr>
-          <p:cNvPr id="3" name="Subtitle 2"/>
-          <p:cNvSpPr>
-            <a:spLocks noGrp="1"/>
-          </p:cNvSpPr>
-          <p:nvPr>
-            <p:ph type="subTitle" idx="1"/>
-          </p:nvPr>
-        </p:nvSpPr>
-        <p:spPr/>
-        <p:txBody>
-          <a:bodyPr/>
-          <a:lstStyle/>
-          <a:p>
+              <a:t>Project Review</a:t>
+            </a:r>
             <a:endParaRPr lang="de-CH" dirty="0"/>
           </a:p>
         </p:txBody>
@@ -3076,8 +3078,8 @@
         </p:blipFill>
         <p:spPr>
           <a:xfrm>
-            <a:off x="2283748" y="1014499"/>
-            <a:ext cx="7624503" cy="2541501"/>
+            <a:off x="3130331" y="1327607"/>
+            <a:ext cx="5931337" cy="1977112"/>
           </a:xfrm>
           <a:prstGeom prst="rect">
             <a:avLst/>
@@ -3146,6 +3148,101 @@
             </a:r>
             <a:r>
               <a:rPr lang="de-CH" dirty="0" smtClean="0"/>
+              <a:t> - </a:t>
+            </a:r>
+            <a:r>
+              <a:rPr lang="de-CH" dirty="0" err="1" smtClean="0"/>
+              <a:t>Org</a:t>
+            </a:r>
+            <a:endParaRPr lang="de-CH" dirty="0"/>
+          </a:p>
+        </p:txBody>
+      </p:sp>
+      <p:sp>
+        <p:nvSpPr>
+          <p:cNvPr id="3" name="Content Placeholder 2"/>
+          <p:cNvSpPr>
+            <a:spLocks noGrp="1"/>
+          </p:cNvSpPr>
+          <p:nvPr>
+            <p:ph idx="1"/>
+          </p:nvPr>
+        </p:nvSpPr>
+        <p:spPr/>
+        <p:txBody>
+          <a:bodyPr/>
+          <a:lstStyle/>
+          <a:p>
+            <a:r>
+              <a:rPr lang="de-CH" dirty="0" smtClean="0"/>
+              <a:t>Show Task List</a:t>
+            </a:r>
+            <a:endParaRPr lang="de-CH" dirty="0"/>
+          </a:p>
+        </p:txBody>
+      </p:sp>
+    </p:spTree>
+    <p:extLst>
+      <p:ext uri="{BB962C8B-B14F-4D97-AF65-F5344CB8AC3E}">
+        <p14:creationId xmlns:p14="http://schemas.microsoft.com/office/powerpoint/2010/main" val="1126572103"/>
+      </p:ext>
+    </p:extLst>
+  </p:cSld>
+  <p:clrMapOvr>
+    <a:masterClrMapping/>
+  </p:clrMapOvr>
+  <p:timing>
+    <p:tnLst>
+      <p:par>
+        <p:cTn id="1" dur="indefinite" restart="never" nodeType="tmRoot"/>
+      </p:par>
+    </p:tnLst>
+  </p:timing>
+</p:sld>
+</file>
+
+<file path=ppt/slides/slide3.xml><?xml version="1.0" encoding="utf-8"?>
+<p:sld xmlns:a="http://schemas.openxmlformats.org/drawingml/2006/main" xmlns:r="http://schemas.openxmlformats.org/officeDocument/2006/relationships" xmlns:p="http://schemas.openxmlformats.org/presentationml/2006/main">
+  <p:cSld>
+    <p:spTree>
+      <p:nvGrpSpPr>
+        <p:cNvPr id="1" name=""/>
+        <p:cNvGrpSpPr/>
+        <p:nvPr/>
+      </p:nvGrpSpPr>
+      <p:grpSpPr>
+        <a:xfrm>
+          <a:off x="0" y="0"/>
+          <a:ext cx="0" cy="0"/>
+          <a:chOff x="0" y="0"/>
+          <a:chExt cx="0" cy="0"/>
+        </a:xfrm>
+      </p:grpSpPr>
+      <p:sp>
+        <p:nvSpPr>
+          <p:cNvPr id="2" name="Title 1"/>
+          <p:cNvSpPr>
+            <a:spLocks noGrp="1"/>
+          </p:cNvSpPr>
+          <p:nvPr>
+            <p:ph type="title"/>
+          </p:nvPr>
+        </p:nvSpPr>
+        <p:spPr/>
+        <p:txBody>
+          <a:bodyPr/>
+          <a:lstStyle/>
+          <a:p>
+            <a:r>
+              <a:rPr lang="de-CH" dirty="0" smtClean="0"/>
+              <a:t>Project </a:t>
+            </a:r>
+            <a:r>
+              <a:rPr lang="de-CH" dirty="0" err="1" smtClean="0"/>
+              <a:t>Overview</a:t>
+            </a:r>
+            <a:r>
+              <a:rPr lang="de-CH" dirty="0" smtClean="0"/>
               <a:t> - DB</a:t>
             </a:r>
             <a:endParaRPr lang="de-CH" dirty="0"/>
@@ -3198,7 +3295,7 @@
 </p:sld>
 </file>
 
-<file path=ppt/slides/slide3.xml><?xml version="1.0" encoding="utf-8"?>
+<file path=ppt/slides/slide4.xml><?xml version="1.0" encoding="utf-8"?>
 <p:sld xmlns:a="http://schemas.openxmlformats.org/drawingml/2006/main" xmlns:r="http://schemas.openxmlformats.org/officeDocument/2006/relationships" xmlns:p="http://schemas.openxmlformats.org/presentationml/2006/main">
   <p:cSld>
     <p:spTree>
@@ -3277,7 +3374,97 @@
 </p:sld>
 </file>
 
-<file path=ppt/slides/slide4.xml><?xml version="1.0" encoding="utf-8"?>
+<file path=ppt/slides/slide5.xml><?xml version="1.0" encoding="utf-8"?>
+<p:sld xmlns:a="http://schemas.openxmlformats.org/drawingml/2006/main" xmlns:r="http://schemas.openxmlformats.org/officeDocument/2006/relationships" xmlns:p="http://schemas.openxmlformats.org/presentationml/2006/main">
+  <p:cSld>
+    <p:spTree>
+      <p:nvGrpSpPr>
+        <p:cNvPr id="1" name=""/>
+        <p:cNvGrpSpPr/>
+        <p:nvPr/>
+      </p:nvGrpSpPr>
+      <p:grpSpPr>
+        <a:xfrm>
+          <a:off x="0" y="0"/>
+          <a:ext cx="0" cy="0"/>
+          <a:chOff x="0" y="0"/>
+          <a:chExt cx="0" cy="0"/>
+        </a:xfrm>
+      </p:grpSpPr>
+      <p:sp>
+        <p:nvSpPr>
+          <p:cNvPr id="2" name="Title 1"/>
+          <p:cNvSpPr>
+            <a:spLocks noGrp="1"/>
+          </p:cNvSpPr>
+          <p:nvPr>
+            <p:ph type="title"/>
+          </p:nvPr>
+        </p:nvSpPr>
+        <p:spPr/>
+        <p:txBody>
+          <a:bodyPr/>
+          <a:lstStyle/>
+          <a:p>
+            <a:r>
+              <a:rPr lang="de-CH" dirty="0" smtClean="0"/>
+              <a:t>Demo</a:t>
+            </a:r>
+            <a:endParaRPr lang="de-CH" dirty="0"/>
+          </a:p>
+        </p:txBody>
+      </p:sp>
+      <p:sp>
+        <p:nvSpPr>
+          <p:cNvPr id="3" name="Content Placeholder 2"/>
+          <p:cNvSpPr>
+            <a:spLocks noGrp="1"/>
+          </p:cNvSpPr>
+          <p:nvPr>
+            <p:ph idx="1"/>
+          </p:nvPr>
+        </p:nvSpPr>
+        <p:spPr/>
+        <p:txBody>
+          <a:bodyPr/>
+          <a:lstStyle/>
+          <a:p>
+            <a:pPr marL="0" indent="0">
+              <a:buNone/>
+            </a:pPr>
+            <a:r>
+              <a:rPr lang="de-CH" dirty="0" err="1" smtClean="0"/>
+              <a:t>Fancy</a:t>
+            </a:r>
+            <a:r>
+              <a:rPr lang="de-CH" dirty="0" smtClean="0"/>
+              <a:t>!</a:t>
+            </a:r>
+            <a:endParaRPr lang="de-CH" dirty="0"/>
+          </a:p>
+        </p:txBody>
+      </p:sp>
+    </p:spTree>
+    <p:extLst>
+      <p:ext uri="{BB962C8B-B14F-4D97-AF65-F5344CB8AC3E}">
+        <p14:creationId xmlns:p14="http://schemas.microsoft.com/office/powerpoint/2010/main" val="4261585540"/>
+      </p:ext>
+    </p:extLst>
+  </p:cSld>
+  <p:clrMapOvr>
+    <a:masterClrMapping/>
+  </p:clrMapOvr>
+  <p:timing>
+    <p:tnLst>
+      <p:par>
+        <p:cTn id="1" dur="indefinite" restart="never" nodeType="tmRoot"/>
+      </p:par>
+    </p:tnLst>
+  </p:timing>
+</p:sld>
+</file>
+
+<file path=ppt/slides/slide6.xml><?xml version="1.0" encoding="utf-8"?>
 <p:sld xmlns:a="http://schemas.openxmlformats.org/drawingml/2006/main" xmlns:r="http://schemas.openxmlformats.org/officeDocument/2006/relationships" xmlns:p="http://schemas.openxmlformats.org/presentationml/2006/main">
   <p:cSld>
     <p:spTree>
@@ -3666,7 +3853,7 @@
 </p:sld>
 </file>
 
-<file path=ppt/slides/slide5.xml><?xml version="1.0" encoding="utf-8"?>
+<file path=ppt/slides/slide7.xml><?xml version="1.0" encoding="utf-8"?>
 <p:sld xmlns:a="http://schemas.openxmlformats.org/drawingml/2006/main" xmlns:r="http://schemas.openxmlformats.org/officeDocument/2006/relationships" xmlns:p="http://schemas.openxmlformats.org/presentationml/2006/main">
   <p:cSld>
     <p:spTree>
@@ -3727,10 +3914,57 @@
             </a:r>
           </a:p>
           <a:p>
+            <a:pPr marL="0" indent="0">
+              <a:buNone/>
+            </a:pPr>
+            <a:endParaRPr lang="de-CH" dirty="0" smtClean="0"/>
+          </a:p>
+          <a:p>
             <a:endParaRPr lang="de-CH" dirty="0"/>
           </a:p>
         </p:txBody>
       </p:sp>
+      <p:pic>
+        <p:nvPicPr>
+          <p:cNvPr id="2050" name="Picture 2" descr="https://fbcdn-sphotos-h-a.akamaihd.net/hphotos-ak-xpf1/v/t34.0-12/961531_10152997852023545_839001810_n.jpg?oh=5635c75abe4cbd1f09077d724a61bef5&amp;oe=54B0D8E2&amp;__gda__=1420880767_3b03b54b1c5c8e846661550cc92b2de1"/>
+          <p:cNvPicPr>
+            <a:picLocks noChangeAspect="1" noChangeArrowheads="1"/>
+          </p:cNvPicPr>
+          <p:nvPr/>
+        </p:nvPicPr>
+        <p:blipFill>
+          <a:blip r:embed="rId2">
+            <a:extLst>
+              <a:ext uri="{28A0092B-C50C-407E-A947-70E740481C1C}">
+                <a14:useLocalDpi xmlns:a14="http://schemas.microsoft.com/office/drawing/2010/main" val="0"/>
+              </a:ext>
+            </a:extLst>
+          </a:blip>
+          <a:srcRect/>
+          <a:stretch>
+            <a:fillRect/>
+          </a:stretch>
+        </p:blipFill>
+        <p:spPr bwMode="auto">
+          <a:xfrm>
+            <a:off x="305651" y="2555646"/>
+            <a:ext cx="11580697" cy="3250068"/>
+          </a:xfrm>
+          <a:prstGeom prst="rect">
+            <a:avLst/>
+          </a:prstGeom>
+          <a:noFill/>
+          <a:extLst>
+            <a:ext uri="{909E8E84-426E-40DD-AFC4-6F175D3DCCD1}">
+              <a14:hiddenFill xmlns:a14="http://schemas.microsoft.com/office/drawing/2010/main">
+                <a:solidFill>
+                  <a:srgbClr val="FFFFFF"/>
+                </a:solidFill>
+              </a14:hiddenFill>
+            </a:ext>
+          </a:extLst>
+        </p:spPr>
+      </p:pic>
     </p:spTree>
     <p:extLst>
       <p:ext uri="{BB962C8B-B14F-4D97-AF65-F5344CB8AC3E}">

</xml_diff>

<commit_message>
modified präsi cleaned tasklist up
</commit_message>
<xml_diff>
--- a/ch.bfh.bti7054.w2014.p.pc-hammer/doc/PCHAMMER.pptx
+++ b/ch.bfh.bti7054.w2014.p.pc-hammer/doc/PCHAMMER.pptx
@@ -10,7 +10,7 @@
     <p:sldId id="257" r:id="rId4"/>
     <p:sldId id="258" r:id="rId5"/>
     <p:sldId id="262" r:id="rId6"/>
-    <p:sldId id="259" r:id="rId7"/>
+    <p:sldId id="263" r:id="rId7"/>
     <p:sldId id="260" r:id="rId8"/>
   </p:sldIdLst>
   <p:sldSz cx="12192000" cy="6858000"/>
@@ -1334,6 +1334,36 @@
           </a:p>
         </p:txBody>
       </p:sp>
+      <p:pic>
+        <p:nvPicPr>
+          <p:cNvPr id="8" name="Picture 7"/>
+          <p:cNvPicPr>
+            <a:picLocks noChangeAspect="1"/>
+          </p:cNvPicPr>
+          <p:nvPr userDrawn="1"/>
+        </p:nvPicPr>
+        <p:blipFill>
+          <a:blip r:embed="rId2">
+            <a:extLst>
+              <a:ext uri="{28A0092B-C50C-407E-A947-70E740481C1C}">
+                <a14:useLocalDpi xmlns:a14="http://schemas.microsoft.com/office/drawing/2010/main" val="0"/>
+              </a:ext>
+            </a:extLst>
+          </a:blip>
+          <a:stretch>
+            <a:fillRect/>
+          </a:stretch>
+        </p:blipFill>
+        <p:spPr>
+          <a:xfrm>
+            <a:off x="7906009" y="185738"/>
+            <a:ext cx="4152381" cy="1384127"/>
+          </a:xfrm>
+          <a:prstGeom prst="rect">
+            <a:avLst/>
+          </a:prstGeom>
+        </p:spPr>
+      </p:pic>
     </p:spTree>
     <p:extLst>
       <p:ext uri="{BB962C8B-B14F-4D97-AF65-F5344CB8AC3E}">
@@ -1344,6 +1374,13 @@
   <p:clrMapOvr>
     <a:masterClrMapping/>
   </p:clrMapOvr>
+  <p:timing>
+    <p:tnLst>
+      <p:par>
+        <p:cTn id="1" dur="indefinite" restart="never" nodeType="tmRoot"/>
+      </p:par>
+    </p:tnLst>
+  </p:timing>
 </p:sldLayout>
 </file>
 
@@ -3086,6 +3123,66 @@
           </a:prstGeom>
         </p:spPr>
       </p:pic>
+      <p:pic>
+        <p:nvPicPr>
+          <p:cNvPr id="6" name="Picture 5"/>
+          <p:cNvPicPr>
+            <a:picLocks noChangeAspect="1"/>
+          </p:cNvPicPr>
+          <p:nvPr/>
+        </p:nvPicPr>
+        <p:blipFill>
+          <a:blip r:embed="rId3">
+            <a:extLst>
+              <a:ext uri="{28A0092B-C50C-407E-A947-70E740481C1C}">
+                <a14:useLocalDpi xmlns:a14="http://schemas.microsoft.com/office/drawing/2010/main" val="0"/>
+              </a:ext>
+            </a:extLst>
+          </a:blip>
+          <a:stretch>
+            <a:fillRect/>
+          </a:stretch>
+        </p:blipFill>
+        <p:spPr>
+          <a:xfrm rot="1055232">
+            <a:off x="7919185" y="3851842"/>
+            <a:ext cx="5072474" cy="2811915"/>
+          </a:xfrm>
+          <a:prstGeom prst="rect">
+            <a:avLst/>
+          </a:prstGeom>
+        </p:spPr>
+      </p:pic>
+      <p:pic>
+        <p:nvPicPr>
+          <p:cNvPr id="7" name="Picture 6"/>
+          <p:cNvPicPr>
+            <a:picLocks noChangeAspect="1"/>
+          </p:cNvPicPr>
+          <p:nvPr/>
+        </p:nvPicPr>
+        <p:blipFill>
+          <a:blip r:embed="rId4" cstate="print">
+            <a:extLst>
+              <a:ext uri="{28A0092B-C50C-407E-A947-70E740481C1C}">
+                <a14:useLocalDpi xmlns:a14="http://schemas.microsoft.com/office/drawing/2010/main" val="0"/>
+              </a:ext>
+            </a:extLst>
+          </a:blip>
+          <a:stretch>
+            <a:fillRect/>
+          </a:stretch>
+        </p:blipFill>
+        <p:spPr>
+          <a:xfrm>
+            <a:off x="4347775" y="4474945"/>
+            <a:ext cx="3838282" cy="2127743"/>
+          </a:xfrm>
+          <a:prstGeom prst="rect">
+            <a:avLst/>
+          </a:prstGeom>
+        </p:spPr>
+      </p:pic>
     </p:spTree>
     <p:extLst>
       <p:ext uri="{BB962C8B-B14F-4D97-AF65-F5344CB8AC3E}">
@@ -3329,7 +3426,11 @@
           <a:p>
             <a:r>
               <a:rPr lang="de-CH" dirty="0" smtClean="0"/>
-              <a:t>Tasks</a:t>
+              <a:t>Tasks – Best </a:t>
+            </a:r>
+            <a:r>
+              <a:rPr lang="de-CH" dirty="0" err="1" smtClean="0"/>
+              <a:t>of</a:t>
             </a:r>
             <a:endParaRPr lang="de-CH" dirty="0"/>
           </a:p>
@@ -3350,7 +3451,22 @@
           <a:bodyPr/>
           <a:lstStyle/>
           <a:p>
-            <a:endParaRPr lang="de-CH"/>
+            <a:r>
+              <a:rPr lang="de-CH" dirty="0" smtClean="0"/>
+              <a:t>Template Engine</a:t>
+            </a:r>
+          </a:p>
+          <a:p>
+            <a:r>
+              <a:rPr lang="de-CH" dirty="0" smtClean="0"/>
+              <a:t>AJAX!</a:t>
+            </a:r>
+          </a:p>
+          <a:p>
+            <a:r>
+              <a:rPr lang="de-CH" dirty="0" smtClean="0"/>
+              <a:t>Database Design</a:t>
+            </a:r>
           </a:p>
         </p:txBody>
       </p:sp>
@@ -3498,7 +3614,7 @@
           <a:p>
             <a:r>
               <a:rPr lang="de-CH" dirty="0" smtClean="0"/>
-              <a:t>Problems - Best </a:t>
+              <a:t>Problems – Best </a:t>
             </a:r>
             <a:r>
               <a:rPr lang="de-CH" dirty="0" err="1" smtClean="0"/>
@@ -3515,7 +3631,7 @@
             <a:spLocks noGrp="1"/>
           </p:cNvSpPr>
           <p:nvPr>
-            <p:ph idx="1"/>
+            <p:ph sz="half" idx="1"/>
           </p:nvPr>
         </p:nvSpPr>
         <p:spPr/>
@@ -3525,232 +3641,170 @@
           <a:p>
             <a:r>
               <a:rPr lang="de-CH" dirty="0" smtClean="0"/>
-              <a:t>Double Insert </a:t>
-            </a:r>
+              <a:t>Double Insert</a:t>
+            </a:r>
+          </a:p>
+          <a:p>
+            <a:endParaRPr lang="de-CH" dirty="0" smtClean="0"/>
+          </a:p>
+          <a:p>
+            <a:endParaRPr lang="de-CH" dirty="0" smtClean="0"/>
+          </a:p>
+          <a:p>
+            <a:endParaRPr lang="de-CH" dirty="0" smtClean="0"/>
+          </a:p>
+          <a:p>
+            <a:endParaRPr lang="de-CH" dirty="0" smtClean="0"/>
+          </a:p>
+          <a:p>
+            <a:r>
+              <a:rPr lang="de-CH" dirty="0" smtClean="0"/>
+              <a:t>JSON </a:t>
+            </a:r>
+            <a:r>
+              <a:rPr lang="de-CH" dirty="0" err="1" smtClean="0"/>
+              <a:t>Encode</a:t>
+            </a:r>
+            <a:r>
+              <a:rPr lang="de-CH" dirty="0" smtClean="0"/>
+              <a:t> </a:t>
+            </a:r>
+          </a:p>
+          <a:p>
             <a:endParaRPr lang="de-CH" dirty="0"/>
           </a:p>
         </p:txBody>
       </p:sp>
       <p:sp>
         <p:nvSpPr>
-          <p:cNvPr id="6" name="Content Placeholder 2"/>
-          <p:cNvSpPr txBox="1">
-            <a:spLocks/>
-          </p:cNvSpPr>
+          <p:cNvPr id="4" name="Content Placeholder 3"/>
+          <p:cNvSpPr>
+            <a:spLocks noGrp="1"/>
+          </p:cNvSpPr>
+          <p:nvPr>
+            <p:ph sz="half" idx="2"/>
+          </p:nvPr>
+        </p:nvSpPr>
+        <p:spPr/>
+        <p:txBody>
+          <a:bodyPr/>
+          <a:lstStyle/>
+          <a:p>
+            <a:r>
+              <a:rPr lang="de-CH" dirty="0" smtClean="0"/>
+              <a:t>GIT </a:t>
+            </a:r>
+            <a:r>
+              <a:rPr lang="de-CH" dirty="0" err="1" smtClean="0"/>
+              <a:t>Synchronization</a:t>
+            </a:r>
+            <a:endParaRPr lang="de-CH" dirty="0" smtClean="0"/>
+          </a:p>
+          <a:p>
+            <a:endParaRPr lang="de-CH" dirty="0"/>
+          </a:p>
+          <a:p>
+            <a:endParaRPr lang="de-CH" dirty="0" smtClean="0"/>
+          </a:p>
+          <a:p>
+            <a:endParaRPr lang="de-CH" dirty="0"/>
+          </a:p>
+          <a:p>
+            <a:endParaRPr lang="de-CH" dirty="0" smtClean="0"/>
+          </a:p>
+          <a:p>
+            <a:r>
+              <a:rPr lang="de-CH" dirty="0" smtClean="0"/>
+              <a:t>Multilingual</a:t>
+            </a:r>
+          </a:p>
+          <a:p>
+            <a:endParaRPr lang="de-CH" dirty="0"/>
+          </a:p>
+        </p:txBody>
+      </p:sp>
+      <p:pic>
+        <p:nvPicPr>
+          <p:cNvPr id="5" name="Picture 2" descr="http://img4.wikia.nocookie.net/__cb20110608094011/reddeadredemption/images/thumb/c/cc/Skull-crossbone.gif/500px-Skull-crossbone.gif"/>
+          <p:cNvPicPr>
+            <a:picLocks noChangeAspect="1" noChangeArrowheads="1"/>
+          </p:cNvPicPr>
           <p:nvPr/>
-        </p:nvSpPr>
-        <p:spPr>
+        </p:nvPicPr>
+        <p:blipFill>
+          <a:blip r:embed="rId2">
+            <a:extLst>
+              <a:ext uri="{28A0092B-C50C-407E-A947-70E740481C1C}">
+                <a14:useLocalDpi xmlns:a14="http://schemas.microsoft.com/office/drawing/2010/main" val="0"/>
+              </a:ext>
+            </a:extLst>
+          </a:blip>
+          <a:srcRect/>
+          <a:stretch>
+            <a:fillRect/>
+          </a:stretch>
+        </p:blipFill>
+        <p:spPr bwMode="auto">
           <a:xfrm>
-            <a:off x="838200" y="1825625"/>
-            <a:ext cx="10515600" cy="4125232"/>
+            <a:off x="3167743" y="1805065"/>
+            <a:ext cx="2369911" cy="1910149"/>
           </a:xfrm>
           <a:prstGeom prst="rect">
             <a:avLst/>
           </a:prstGeom>
+          <a:noFill/>
+          <a:extLst>
+            <a:ext uri="{909E8E84-426E-40DD-AFC4-6F175D3DCCD1}">
+              <a14:hiddenFill xmlns:a14="http://schemas.microsoft.com/office/drawing/2010/main">
+                <a:solidFill>
+                  <a:srgbClr val="FFFFFF"/>
+                </a:solidFill>
+              </a14:hiddenFill>
+            </a:ext>
+          </a:extLst>
         </p:spPr>
-        <p:txBody>
-          <a:bodyPr vert="horz" lIns="91440" tIns="45720" rIns="91440" bIns="45720" rtlCol="0">
-            <a:normAutofit/>
-          </a:bodyPr>
-          <a:lstStyle>
-            <a:lvl1pPr marL="228600" indent="-228600" algn="l" defTabSz="914400" rtl="0" eaLnBrk="1" latinLnBrk="0" hangingPunct="1">
-              <a:lnSpc>
-                <a:spcPct val="90000"/>
-              </a:lnSpc>
-              <a:spcBef>
-                <a:spcPts val="1000"/>
-              </a:spcBef>
-              <a:buFont typeface="Arial" panose="020B0604020202020204" pitchFamily="34" charset="0"/>
-              <a:buChar char="•"/>
-              <a:defRPr sz="2800" kern="1200">
+      </p:pic>
+      <p:pic>
+        <p:nvPicPr>
+          <p:cNvPr id="6" name="Picture 2" descr="http://img4.wikia.nocookie.net/__cb20110608094011/reddeadredemption/images/thumb/c/cc/Skull-crossbone.gif/500px-Skull-crossbone.gif"/>
+          <p:cNvPicPr>
+            <a:picLocks noChangeAspect="1" noChangeArrowheads="1"/>
+          </p:cNvPicPr>
+          <p:nvPr/>
+        </p:nvPicPr>
+        <p:blipFill>
+          <a:blip r:embed="rId2">
+            <a:extLst>
+              <a:ext uri="{28A0092B-C50C-407E-A947-70E740481C1C}">
+                <a14:useLocalDpi xmlns:a14="http://schemas.microsoft.com/office/drawing/2010/main" val="0"/>
+              </a:ext>
+            </a:extLst>
+          </a:blip>
+          <a:srcRect/>
+          <a:stretch>
+            <a:fillRect/>
+          </a:stretch>
+        </p:blipFill>
+        <p:spPr bwMode="auto">
+          <a:xfrm>
+            <a:off x="3167743" y="4401751"/>
+            <a:ext cx="2369911" cy="1910149"/>
+          </a:xfrm>
+          <a:prstGeom prst="rect">
+            <a:avLst/>
+          </a:prstGeom>
+          <a:noFill/>
+          <a:extLst>
+            <a:ext uri="{909E8E84-426E-40DD-AFC4-6F175D3DCCD1}">
+              <a14:hiddenFill xmlns:a14="http://schemas.microsoft.com/office/drawing/2010/main">
                 <a:solidFill>
-                  <a:schemeClr val="tx1"/>
+                  <a:srgbClr val="FFFFFF"/>
                 </a:solidFill>
-                <a:latin typeface="+mn-lt"/>
-                <a:ea typeface="+mn-ea"/>
-                <a:cs typeface="+mn-cs"/>
-              </a:defRPr>
-            </a:lvl1pPr>
-            <a:lvl2pPr marL="685800" indent="-228600" algn="l" defTabSz="914400" rtl="0" eaLnBrk="1" latinLnBrk="0" hangingPunct="1">
-              <a:lnSpc>
-                <a:spcPct val="90000"/>
-              </a:lnSpc>
-              <a:spcBef>
-                <a:spcPts val="500"/>
-              </a:spcBef>
-              <a:buFont typeface="Arial" panose="020B0604020202020204" pitchFamily="34" charset="0"/>
-              <a:buChar char="•"/>
-              <a:defRPr sz="2400" kern="1200">
-                <a:solidFill>
-                  <a:schemeClr val="tx1"/>
-                </a:solidFill>
-                <a:latin typeface="+mn-lt"/>
-                <a:ea typeface="+mn-ea"/>
-                <a:cs typeface="+mn-cs"/>
-              </a:defRPr>
-            </a:lvl2pPr>
-            <a:lvl3pPr marL="1143000" indent="-228600" algn="l" defTabSz="914400" rtl="0" eaLnBrk="1" latinLnBrk="0" hangingPunct="1">
-              <a:lnSpc>
-                <a:spcPct val="90000"/>
-              </a:lnSpc>
-              <a:spcBef>
-                <a:spcPts val="500"/>
-              </a:spcBef>
-              <a:buFont typeface="Arial" panose="020B0604020202020204" pitchFamily="34" charset="0"/>
-              <a:buChar char="•"/>
-              <a:defRPr sz="2000" kern="1200">
-                <a:solidFill>
-                  <a:schemeClr val="tx1"/>
-                </a:solidFill>
-                <a:latin typeface="+mn-lt"/>
-                <a:ea typeface="+mn-ea"/>
-                <a:cs typeface="+mn-cs"/>
-              </a:defRPr>
-            </a:lvl3pPr>
-            <a:lvl4pPr marL="1600200" indent="-228600" algn="l" defTabSz="914400" rtl="0" eaLnBrk="1" latinLnBrk="0" hangingPunct="1">
-              <a:lnSpc>
-                <a:spcPct val="90000"/>
-              </a:lnSpc>
-              <a:spcBef>
-                <a:spcPts val="500"/>
-              </a:spcBef>
-              <a:buFont typeface="Arial" panose="020B0604020202020204" pitchFamily="34" charset="0"/>
-              <a:buChar char="•"/>
-              <a:defRPr sz="1800" kern="1200">
-                <a:solidFill>
-                  <a:schemeClr val="tx1"/>
-                </a:solidFill>
-                <a:latin typeface="+mn-lt"/>
-                <a:ea typeface="+mn-ea"/>
-                <a:cs typeface="+mn-cs"/>
-              </a:defRPr>
-            </a:lvl4pPr>
-            <a:lvl5pPr marL="2057400" indent="-228600" algn="l" defTabSz="914400" rtl="0" eaLnBrk="1" latinLnBrk="0" hangingPunct="1">
-              <a:lnSpc>
-                <a:spcPct val="90000"/>
-              </a:lnSpc>
-              <a:spcBef>
-                <a:spcPts val="500"/>
-              </a:spcBef>
-              <a:buFont typeface="Arial" panose="020B0604020202020204" pitchFamily="34" charset="0"/>
-              <a:buChar char="•"/>
-              <a:defRPr sz="1800" kern="1200">
-                <a:solidFill>
-                  <a:schemeClr val="tx1"/>
-                </a:solidFill>
-                <a:latin typeface="+mn-lt"/>
-                <a:ea typeface="+mn-ea"/>
-                <a:cs typeface="+mn-cs"/>
-              </a:defRPr>
-            </a:lvl5pPr>
-            <a:lvl6pPr marL="2514600" indent="-228600" algn="l" defTabSz="914400" rtl="0" eaLnBrk="1" latinLnBrk="0" hangingPunct="1">
-              <a:lnSpc>
-                <a:spcPct val="90000"/>
-              </a:lnSpc>
-              <a:spcBef>
-                <a:spcPts val="500"/>
-              </a:spcBef>
-              <a:buFont typeface="Arial" panose="020B0604020202020204" pitchFamily="34" charset="0"/>
-              <a:buChar char="•"/>
-              <a:defRPr sz="1800" kern="1200">
-                <a:solidFill>
-                  <a:schemeClr val="tx1"/>
-                </a:solidFill>
-                <a:latin typeface="+mn-lt"/>
-                <a:ea typeface="+mn-ea"/>
-                <a:cs typeface="+mn-cs"/>
-              </a:defRPr>
-            </a:lvl6pPr>
-            <a:lvl7pPr marL="2971800" indent="-228600" algn="l" defTabSz="914400" rtl="0" eaLnBrk="1" latinLnBrk="0" hangingPunct="1">
-              <a:lnSpc>
-                <a:spcPct val="90000"/>
-              </a:lnSpc>
-              <a:spcBef>
-                <a:spcPts val="500"/>
-              </a:spcBef>
-              <a:buFont typeface="Arial" panose="020B0604020202020204" pitchFamily="34" charset="0"/>
-              <a:buChar char="•"/>
-              <a:defRPr sz="1800" kern="1200">
-                <a:solidFill>
-                  <a:schemeClr val="tx1"/>
-                </a:solidFill>
-                <a:latin typeface="+mn-lt"/>
-                <a:ea typeface="+mn-ea"/>
-                <a:cs typeface="+mn-cs"/>
-              </a:defRPr>
-            </a:lvl7pPr>
-            <a:lvl8pPr marL="3429000" indent="-228600" algn="l" defTabSz="914400" rtl="0" eaLnBrk="1" latinLnBrk="0" hangingPunct="1">
-              <a:lnSpc>
-                <a:spcPct val="90000"/>
-              </a:lnSpc>
-              <a:spcBef>
-                <a:spcPts val="500"/>
-              </a:spcBef>
-              <a:buFont typeface="Arial" panose="020B0604020202020204" pitchFamily="34" charset="0"/>
-              <a:buChar char="•"/>
-              <a:defRPr sz="1800" kern="1200">
-                <a:solidFill>
-                  <a:schemeClr val="tx1"/>
-                </a:solidFill>
-                <a:latin typeface="+mn-lt"/>
-                <a:ea typeface="+mn-ea"/>
-                <a:cs typeface="+mn-cs"/>
-              </a:defRPr>
-            </a:lvl8pPr>
-            <a:lvl9pPr marL="3886200" indent="-228600" algn="l" defTabSz="914400" rtl="0" eaLnBrk="1" latinLnBrk="0" hangingPunct="1">
-              <a:lnSpc>
-                <a:spcPct val="90000"/>
-              </a:lnSpc>
-              <a:spcBef>
-                <a:spcPts val="500"/>
-              </a:spcBef>
-              <a:buFont typeface="Arial" panose="020B0604020202020204" pitchFamily="34" charset="0"/>
-              <a:buChar char="•"/>
-              <a:defRPr sz="1800" kern="1200">
-                <a:solidFill>
-                  <a:schemeClr val="tx1"/>
-                </a:solidFill>
-                <a:latin typeface="+mn-lt"/>
-                <a:ea typeface="+mn-ea"/>
-                <a:cs typeface="+mn-cs"/>
-              </a:defRPr>
-            </a:lvl9pPr>
-          </a:lstStyle>
-          <a:p>
-            <a:r>
-              <a:rPr lang="de-CH" dirty="0" smtClean="0"/>
-              <a:t>Double Insert</a:t>
-            </a:r>
-          </a:p>
-          <a:p>
-            <a:endParaRPr lang="de-CH" dirty="0"/>
-          </a:p>
-          <a:p>
-            <a:endParaRPr lang="de-CH" dirty="0" smtClean="0"/>
-          </a:p>
-          <a:p>
-            <a:endParaRPr lang="de-CH" dirty="0"/>
-          </a:p>
-          <a:p>
-            <a:endParaRPr lang="de-CH" dirty="0" smtClean="0"/>
-          </a:p>
-          <a:p>
-            <a:r>
-              <a:rPr lang="de-CH" dirty="0" smtClean="0"/>
-              <a:t>JSON </a:t>
-            </a:r>
-            <a:r>
-              <a:rPr lang="de-CH" dirty="0" err="1" smtClean="0"/>
-              <a:t>Encode</a:t>
-            </a:r>
-            <a:r>
-              <a:rPr lang="de-CH" dirty="0" smtClean="0"/>
-              <a:t> </a:t>
-            </a:r>
-            <a:endParaRPr lang="de-CH" dirty="0"/>
-          </a:p>
-        </p:txBody>
-      </p:sp>
+              </a14:hiddenFill>
+            </a:ext>
+          </a:extLst>
+        </p:spPr>
+      </p:pic>
       <p:pic>
         <p:nvPicPr>
           <p:cNvPr id="7" name="Picture 2" descr="http://img4.wikia.nocookie.net/__cb20110608094011/reddeadredemption/images/thumb/c/cc/Skull-crossbone.gif/500px-Skull-crossbone.gif"/>
@@ -3774,7 +3828,7 @@
         </p:blipFill>
         <p:spPr bwMode="auto">
           <a:xfrm>
-            <a:off x="3701052" y="1825625"/>
+            <a:off x="9445171" y="1825624"/>
             <a:ext cx="2369911" cy="1910149"/>
           </a:xfrm>
           <a:prstGeom prst="rect">
@@ -3815,7 +3869,7 @@
         </p:blipFill>
         <p:spPr bwMode="auto">
           <a:xfrm>
-            <a:off x="3701052" y="4266814"/>
+            <a:off x="9445170" y="4401750"/>
             <a:ext cx="2369911" cy="1910149"/>
           </a:xfrm>
           <a:prstGeom prst="rect">
@@ -3836,7 +3890,7 @@
     </p:spTree>
     <p:extLst>
       <p:ext uri="{BB962C8B-B14F-4D97-AF65-F5344CB8AC3E}">
-        <p14:creationId xmlns:p14="http://schemas.microsoft.com/office/powerpoint/2010/main" val="147223425"/>
+        <p14:creationId xmlns:p14="http://schemas.microsoft.com/office/powerpoint/2010/main" val="1360827271"/>
       </p:ext>
     </p:extLst>
   </p:cSld>
@@ -3908,6 +3962,9 @@
           <a:bodyPr/>
           <a:lstStyle/>
           <a:p>
+            <a:pPr marL="0" indent="0">
+              <a:buNone/>
+            </a:pPr>
             <a:r>
               <a:rPr lang="de-CH" dirty="0" smtClean="0"/>
               <a:t>«Unterschätze die Arbeit nicht»</a:t>

</xml_diff>

<commit_message>
added contact form, update excel and ppt
</commit_message>
<xml_diff>
--- a/ch.bfh.bti7054.w2014.p.pc-hammer/doc/PCHAMMER.pptx
+++ b/ch.bfh.bti7054.w2014.p.pc-hammer/doc/PCHAMMER.pptx
@@ -7,11 +7,14 @@
   <p:sldIdLst>
     <p:sldId id="256" r:id="rId2"/>
     <p:sldId id="261" r:id="rId3"/>
-    <p:sldId id="257" r:id="rId4"/>
-    <p:sldId id="258" r:id="rId5"/>
-    <p:sldId id="262" r:id="rId6"/>
-    <p:sldId id="263" r:id="rId7"/>
-    <p:sldId id="260" r:id="rId8"/>
+    <p:sldId id="266" r:id="rId4"/>
+    <p:sldId id="264" r:id="rId5"/>
+    <p:sldId id="265" r:id="rId6"/>
+    <p:sldId id="257" r:id="rId7"/>
+    <p:sldId id="258" r:id="rId8"/>
+    <p:sldId id="262" r:id="rId9"/>
+    <p:sldId id="263" r:id="rId10"/>
+    <p:sldId id="260" r:id="rId11"/>
   </p:sldIdLst>
   <p:sldSz cx="12192000" cy="6858000"/>
   <p:notesSz cx="6858000" cy="9144000"/>
@@ -110,6 +113,11 @@
       </a:defRPr>
     </a:lvl9pPr>
   </p:defaultTextStyle>
+  <p:extLst>
+    <p:ext uri="{EFAFB233-063F-42B5-8137-9DF3F51BA10A}">
+      <p15:sldGuideLst xmlns:p15="http://schemas.microsoft.com/office/powerpoint/2012/main"/>
+    </p:ext>
+  </p:extLst>
 </p:presentation>
 </file>
 
@@ -3203,6 +3211,141 @@
 </p:sld>
 </file>
 
+<file path=ppt/slides/slide10.xml><?xml version="1.0" encoding="utf-8"?>
+<p:sld xmlns:a="http://schemas.openxmlformats.org/drawingml/2006/main" xmlns:r="http://schemas.openxmlformats.org/officeDocument/2006/relationships" xmlns:p="http://schemas.openxmlformats.org/presentationml/2006/main">
+  <p:cSld>
+    <p:spTree>
+      <p:nvGrpSpPr>
+        <p:cNvPr id="1" name=""/>
+        <p:cNvGrpSpPr/>
+        <p:nvPr/>
+      </p:nvGrpSpPr>
+      <p:grpSpPr>
+        <a:xfrm>
+          <a:off x="0" y="0"/>
+          <a:ext cx="0" cy="0"/>
+          <a:chOff x="0" y="0"/>
+          <a:chExt cx="0" cy="0"/>
+        </a:xfrm>
+      </p:grpSpPr>
+      <p:sp>
+        <p:nvSpPr>
+          <p:cNvPr id="2" name="Title 1"/>
+          <p:cNvSpPr>
+            <a:spLocks noGrp="1"/>
+          </p:cNvSpPr>
+          <p:nvPr>
+            <p:ph type="title"/>
+          </p:nvPr>
+        </p:nvSpPr>
+        <p:spPr/>
+        <p:txBody>
+          <a:bodyPr/>
+          <a:lstStyle/>
+          <a:p>
+            <a:r>
+              <a:rPr lang="de-CH" dirty="0" err="1" smtClean="0"/>
+              <a:t>Conclusion</a:t>
+            </a:r>
+            <a:endParaRPr lang="de-CH" dirty="0"/>
+          </a:p>
+        </p:txBody>
+      </p:sp>
+      <p:sp>
+        <p:nvSpPr>
+          <p:cNvPr id="3" name="Content Placeholder 2"/>
+          <p:cNvSpPr>
+            <a:spLocks noGrp="1"/>
+          </p:cNvSpPr>
+          <p:nvPr>
+            <p:ph idx="1"/>
+          </p:nvPr>
+        </p:nvSpPr>
+        <p:spPr/>
+        <p:txBody>
+          <a:bodyPr/>
+          <a:lstStyle/>
+          <a:p>
+            <a:pPr marL="0" indent="0">
+              <a:buNone/>
+            </a:pPr>
+            <a:r>
+              <a:rPr lang="de-CH" dirty="0" smtClean="0"/>
+              <a:t>«Unterschätze die Arbeit nicht»</a:t>
+            </a:r>
+          </a:p>
+          <a:p>
+            <a:pPr marL="0" indent="0">
+              <a:buNone/>
+            </a:pPr>
+            <a:endParaRPr lang="de-CH" dirty="0" smtClean="0"/>
+          </a:p>
+          <a:p>
+            <a:endParaRPr lang="de-CH" dirty="0"/>
+          </a:p>
+        </p:txBody>
+      </p:sp>
+      <p:pic>
+        <p:nvPicPr>
+          <p:cNvPr id="2050" name="Picture 2" descr="https://fbcdn-sphotos-h-a.akamaihd.net/hphotos-ak-xpf1/v/t34.0-12/961531_10152997852023545_839001810_n.jpg?oh=5635c75abe4cbd1f09077d724a61bef5&amp;oe=54B0D8E2&amp;__gda__=1420880767_3b03b54b1c5c8e846661550cc92b2de1"/>
+          <p:cNvPicPr>
+            <a:picLocks noChangeAspect="1" noChangeArrowheads="1"/>
+          </p:cNvPicPr>
+          <p:nvPr/>
+        </p:nvPicPr>
+        <p:blipFill>
+          <a:blip r:embed="rId2">
+            <a:extLst>
+              <a:ext uri="{28A0092B-C50C-407E-A947-70E740481C1C}">
+                <a14:useLocalDpi xmlns:a14="http://schemas.microsoft.com/office/drawing/2010/main" val="0"/>
+              </a:ext>
+            </a:extLst>
+          </a:blip>
+          <a:srcRect/>
+          <a:stretch>
+            <a:fillRect/>
+          </a:stretch>
+        </p:blipFill>
+        <p:spPr bwMode="auto">
+          <a:xfrm>
+            <a:off x="305651" y="2555646"/>
+            <a:ext cx="11580697" cy="3250068"/>
+          </a:xfrm>
+          <a:prstGeom prst="rect">
+            <a:avLst/>
+          </a:prstGeom>
+          <a:noFill/>
+          <a:extLst>
+            <a:ext uri="{909E8E84-426E-40DD-AFC4-6F175D3DCCD1}">
+              <a14:hiddenFill xmlns:a14="http://schemas.microsoft.com/office/drawing/2010/main">
+                <a:solidFill>
+                  <a:srgbClr val="FFFFFF"/>
+                </a:solidFill>
+              </a14:hiddenFill>
+            </a:ext>
+          </a:extLst>
+        </p:spPr>
+      </p:pic>
+    </p:spTree>
+    <p:extLst>
+      <p:ext uri="{BB962C8B-B14F-4D97-AF65-F5344CB8AC3E}">
+        <p14:creationId xmlns:p14="http://schemas.microsoft.com/office/powerpoint/2010/main" val="3869012398"/>
+      </p:ext>
+    </p:extLst>
+  </p:cSld>
+  <p:clrMapOvr>
+    <a:masterClrMapping/>
+  </p:clrMapOvr>
+  <p:timing>
+    <p:tnLst>
+      <p:par>
+        <p:cTn id="1" dur="indefinite" restart="never" nodeType="tmRoot"/>
+      </p:par>
+    </p:tnLst>
+  </p:timing>
+</p:sld>
+</file>
+
 <file path=ppt/slides/slide2.xml><?xml version="1.0" encoding="utf-8"?>
 <p:sld xmlns:a="http://schemas.openxmlformats.org/drawingml/2006/main" xmlns:r="http://schemas.openxmlformats.org/officeDocument/2006/relationships" xmlns:p="http://schemas.openxmlformats.org/presentationml/2006/main">
   <p:cSld>
@@ -3271,9 +3414,24 @@
           <a:lstStyle/>
           <a:p>
             <a:r>
-              <a:rPr lang="de-CH" dirty="0" smtClean="0"/>
-              <a:t>Show Task List</a:t>
-            </a:r>
+              <a:rPr lang="de-CH" dirty="0" err="1" smtClean="0"/>
+              <a:t>Github</a:t>
+            </a:r>
+            <a:endParaRPr lang="de-CH" dirty="0" smtClean="0"/>
+          </a:p>
+          <a:p>
+            <a:r>
+              <a:rPr lang="en-US" dirty="0" smtClean="0"/>
+              <a:t>Extreme programming</a:t>
+            </a:r>
+          </a:p>
+          <a:p>
+            <a:r>
+              <a:rPr lang="en-US" dirty="0" smtClean="0"/>
+              <a:t>Skype</a:t>
+            </a:r>
+          </a:p>
+          <a:p>
             <a:endParaRPr lang="de-CH" dirty="0"/>
           </a:p>
         </p:txBody>
@@ -3299,6 +3457,303 @@
 </file>
 
 <file path=ppt/slides/slide3.xml><?xml version="1.0" encoding="utf-8"?>
+<p:sld xmlns:a="http://schemas.openxmlformats.org/drawingml/2006/main" xmlns:r="http://schemas.openxmlformats.org/officeDocument/2006/relationships" xmlns:p="http://schemas.openxmlformats.org/presentationml/2006/main" show="0">
+  <p:cSld>
+    <p:spTree>
+      <p:nvGrpSpPr>
+        <p:cNvPr id="1" name=""/>
+        <p:cNvGrpSpPr/>
+        <p:nvPr/>
+      </p:nvGrpSpPr>
+      <p:grpSpPr>
+        <a:xfrm>
+          <a:off x="0" y="0"/>
+          <a:ext cx="0" cy="0"/>
+          <a:chOff x="0" y="0"/>
+          <a:chExt cx="0" cy="0"/>
+        </a:xfrm>
+      </p:grpSpPr>
+      <p:sp>
+        <p:nvSpPr>
+          <p:cNvPr id="2" name="Title 1"/>
+          <p:cNvSpPr>
+            <a:spLocks noGrp="1"/>
+          </p:cNvSpPr>
+          <p:nvPr>
+            <p:ph type="title"/>
+          </p:nvPr>
+        </p:nvSpPr>
+        <p:spPr/>
+        <p:txBody>
+          <a:bodyPr/>
+          <a:lstStyle/>
+          <a:p>
+            <a:r>
+              <a:rPr lang="en-US" dirty="0" smtClean="0"/>
+              <a:t>Distribution of work</a:t>
+            </a:r>
+            <a:endParaRPr lang="de-CH" dirty="0"/>
+          </a:p>
+        </p:txBody>
+      </p:sp>
+      <p:sp>
+        <p:nvSpPr>
+          <p:cNvPr id="3" name="Content Placeholder 2"/>
+          <p:cNvSpPr>
+            <a:spLocks noGrp="1"/>
+          </p:cNvSpPr>
+          <p:nvPr>
+            <p:ph idx="1"/>
+          </p:nvPr>
+        </p:nvSpPr>
+        <p:spPr/>
+        <p:txBody>
+          <a:bodyPr/>
+          <a:lstStyle/>
+          <a:p>
+            <a:r>
+              <a:rPr lang="en-US" dirty="0" smtClean="0"/>
+              <a:t>See Excel</a:t>
+            </a:r>
+            <a:endParaRPr lang="de-CH" dirty="0"/>
+          </a:p>
+        </p:txBody>
+      </p:sp>
+    </p:spTree>
+    <p:extLst>
+      <p:ext uri="{BB962C8B-B14F-4D97-AF65-F5344CB8AC3E}">
+        <p14:creationId xmlns:p14="http://schemas.microsoft.com/office/powerpoint/2010/main" val="3090225137"/>
+      </p:ext>
+    </p:extLst>
+  </p:cSld>
+  <p:clrMapOvr>
+    <a:masterClrMapping/>
+  </p:clrMapOvr>
+  <mc:AlternateContent xmlns:mc="http://schemas.openxmlformats.org/markup-compatibility/2006">
+    <mc:Choice xmlns:p14="http://schemas.microsoft.com/office/powerpoint/2010/main" Requires="p14">
+      <p:transition spd="slow" p14:dur="2000"/>
+    </mc:Choice>
+    <mc:Fallback>
+      <p:transition spd="slow"/>
+    </mc:Fallback>
+  </mc:AlternateContent>
+</p:sld>
+</file>
+
+<file path=ppt/slides/slide4.xml><?xml version="1.0" encoding="utf-8"?>
+<p:sld xmlns:a="http://schemas.openxmlformats.org/drawingml/2006/main" xmlns:r="http://schemas.openxmlformats.org/officeDocument/2006/relationships" xmlns:p="http://schemas.openxmlformats.org/presentationml/2006/main">
+  <p:cSld>
+    <p:spTree>
+      <p:nvGrpSpPr>
+        <p:cNvPr id="1" name=""/>
+        <p:cNvGrpSpPr/>
+        <p:nvPr/>
+      </p:nvGrpSpPr>
+      <p:grpSpPr>
+        <a:xfrm>
+          <a:off x="0" y="0"/>
+          <a:ext cx="0" cy="0"/>
+          <a:chOff x="0" y="0"/>
+          <a:chExt cx="0" cy="0"/>
+        </a:xfrm>
+      </p:grpSpPr>
+      <p:sp>
+        <p:nvSpPr>
+          <p:cNvPr id="2" name="Title 1"/>
+          <p:cNvSpPr>
+            <a:spLocks noGrp="1"/>
+          </p:cNvSpPr>
+          <p:nvPr>
+            <p:ph type="title"/>
+          </p:nvPr>
+        </p:nvSpPr>
+        <p:spPr/>
+        <p:txBody>
+          <a:bodyPr/>
+          <a:lstStyle/>
+          <a:p>
+            <a:r>
+              <a:rPr lang="en-US" dirty="0" smtClean="0"/>
+              <a:t>Technologies Used</a:t>
+            </a:r>
+            <a:endParaRPr lang="de-CH" dirty="0"/>
+          </a:p>
+        </p:txBody>
+      </p:sp>
+      <p:sp>
+        <p:nvSpPr>
+          <p:cNvPr id="3" name="Content Placeholder 2"/>
+          <p:cNvSpPr>
+            <a:spLocks noGrp="1"/>
+          </p:cNvSpPr>
+          <p:nvPr>
+            <p:ph idx="1"/>
+          </p:nvPr>
+        </p:nvSpPr>
+        <p:spPr/>
+        <p:txBody>
+          <a:bodyPr/>
+          <a:lstStyle/>
+          <a:p>
+            <a:r>
+              <a:rPr lang="en-US" dirty="0" smtClean="0"/>
+              <a:t>AJAX</a:t>
+            </a:r>
+          </a:p>
+          <a:p>
+            <a:r>
+              <a:rPr lang="en-US" dirty="0" smtClean="0"/>
+              <a:t>JQuery</a:t>
+            </a:r>
+          </a:p>
+          <a:p>
+            <a:r>
+              <a:rPr lang="en-US" dirty="0" smtClean="0"/>
+              <a:t>Bootstrap</a:t>
+            </a:r>
+          </a:p>
+          <a:p>
+            <a:r>
+              <a:rPr lang="en-US" dirty="0" smtClean="0"/>
+              <a:t>Smarty</a:t>
+            </a:r>
+          </a:p>
+          <a:p>
+            <a:endParaRPr lang="de-CH" dirty="0"/>
+          </a:p>
+        </p:txBody>
+      </p:sp>
+    </p:spTree>
+    <p:extLst>
+      <p:ext uri="{BB962C8B-B14F-4D97-AF65-F5344CB8AC3E}">
+        <p14:creationId xmlns:p14="http://schemas.microsoft.com/office/powerpoint/2010/main" val="3107946722"/>
+      </p:ext>
+    </p:extLst>
+  </p:cSld>
+  <p:clrMapOvr>
+    <a:masterClrMapping/>
+  </p:clrMapOvr>
+</p:sld>
+</file>
+
+<file path=ppt/slides/slide5.xml><?xml version="1.0" encoding="utf-8"?>
+<p:sld xmlns:a="http://schemas.openxmlformats.org/drawingml/2006/main" xmlns:r="http://schemas.openxmlformats.org/officeDocument/2006/relationships" xmlns:p="http://schemas.openxmlformats.org/presentationml/2006/main" show="0">
+  <p:cSld>
+    <p:spTree>
+      <p:nvGrpSpPr>
+        <p:cNvPr id="1" name=""/>
+        <p:cNvGrpSpPr/>
+        <p:nvPr/>
+      </p:nvGrpSpPr>
+      <p:grpSpPr>
+        <a:xfrm>
+          <a:off x="0" y="0"/>
+          <a:ext cx="0" cy="0"/>
+          <a:chOff x="0" y="0"/>
+          <a:chExt cx="0" cy="0"/>
+        </a:xfrm>
+      </p:grpSpPr>
+      <p:sp>
+        <p:nvSpPr>
+          <p:cNvPr id="2" name="Title 1"/>
+          <p:cNvSpPr>
+            <a:spLocks noGrp="1"/>
+          </p:cNvSpPr>
+          <p:nvPr>
+            <p:ph type="title"/>
+          </p:nvPr>
+        </p:nvSpPr>
+        <p:spPr/>
+        <p:txBody>
+          <a:bodyPr/>
+          <a:lstStyle/>
+          <a:p>
+            <a:r>
+              <a:rPr lang="en-US" dirty="0" smtClean="0"/>
+              <a:t>Features Implemented</a:t>
+            </a:r>
+            <a:endParaRPr lang="de-CH" dirty="0"/>
+          </a:p>
+        </p:txBody>
+      </p:sp>
+      <p:pic>
+        <p:nvPicPr>
+          <p:cNvPr id="4" name="Content Placeholder 3"/>
+          <p:cNvPicPr>
+            <a:picLocks noGrp="1" noChangeAspect="1"/>
+          </p:cNvPicPr>
+          <p:nvPr>
+            <p:ph idx="1"/>
+          </p:nvPr>
+        </p:nvPicPr>
+        <p:blipFill>
+          <a:blip r:embed="rId2"/>
+          <a:stretch>
+            <a:fillRect/>
+          </a:stretch>
+        </p:blipFill>
+        <p:spPr>
+          <a:xfrm>
+            <a:off x="3211985" y="2014301"/>
+            <a:ext cx="4400550" cy="3133725"/>
+          </a:xfrm>
+          <a:prstGeom prst="rect">
+            <a:avLst/>
+          </a:prstGeom>
+        </p:spPr>
+      </p:pic>
+      <p:sp>
+        <p:nvSpPr>
+          <p:cNvPr id="5" name="TextBox 4"/>
+          <p:cNvSpPr txBox="1"/>
+          <p:nvPr/>
+        </p:nvSpPr>
+        <p:spPr>
+          <a:xfrm>
+            <a:off x="4023882" y="5471639"/>
+            <a:ext cx="2776756" cy="369332"/>
+          </a:xfrm>
+          <a:prstGeom prst="rect">
+            <a:avLst/>
+          </a:prstGeom>
+          <a:noFill/>
+        </p:spPr>
+        <p:txBody>
+          <a:bodyPr wrap="square" rtlCol="0">
+            <a:spAutoFit/>
+          </a:bodyPr>
+          <a:lstStyle/>
+          <a:p>
+            <a:r>
+              <a:rPr lang="en-US" dirty="0" smtClean="0"/>
+              <a:t>Details: See Excel</a:t>
+            </a:r>
+            <a:endParaRPr lang="de-CH" dirty="0"/>
+          </a:p>
+        </p:txBody>
+      </p:sp>
+    </p:spTree>
+    <p:extLst>
+      <p:ext uri="{BB962C8B-B14F-4D97-AF65-F5344CB8AC3E}">
+        <p14:creationId xmlns:p14="http://schemas.microsoft.com/office/powerpoint/2010/main" val="865040915"/>
+      </p:ext>
+    </p:extLst>
+  </p:cSld>
+  <p:clrMapOvr>
+    <a:masterClrMapping/>
+  </p:clrMapOvr>
+  <mc:AlternateContent xmlns:mc="http://schemas.openxmlformats.org/markup-compatibility/2006">
+    <mc:Choice xmlns:p14="http://schemas.microsoft.com/office/powerpoint/2010/main" Requires="p14">
+      <p:transition spd="slow" p14:dur="2000"/>
+    </mc:Choice>
+    <mc:Fallback>
+      <p:transition spd="slow"/>
+    </mc:Fallback>
+  </mc:AlternateContent>
+</p:sld>
+</file>
+
+<file path=ppt/slides/slide6.xml><?xml version="1.0" encoding="utf-8"?>
 <p:sld xmlns:a="http://schemas.openxmlformats.org/drawingml/2006/main" xmlns:r="http://schemas.openxmlformats.org/officeDocument/2006/relationships" xmlns:p="http://schemas.openxmlformats.org/presentationml/2006/main">
   <p:cSld>
     <p:spTree>
@@ -3392,7 +3847,7 @@
 </p:sld>
 </file>
 
-<file path=ppt/slides/slide4.xml><?xml version="1.0" encoding="utf-8"?>
+<file path=ppt/slides/slide7.xml><?xml version="1.0" encoding="utf-8"?>
 <p:sld xmlns:a="http://schemas.openxmlformats.org/drawingml/2006/main" xmlns:r="http://schemas.openxmlformats.org/officeDocument/2006/relationships" xmlns:p="http://schemas.openxmlformats.org/presentationml/2006/main">
   <p:cSld>
     <p:spTree>
@@ -3465,8 +3920,19 @@
           <a:p>
             <a:r>
               <a:rPr lang="de-CH" dirty="0" smtClean="0"/>
-              <a:t>Database Design</a:t>
-            </a:r>
+              <a:t>Database </a:t>
+            </a:r>
+            <a:r>
+              <a:rPr lang="de-CH" dirty="0" smtClean="0"/>
+              <a:t>Design</a:t>
+            </a:r>
+          </a:p>
+          <a:p>
+            <a:r>
+              <a:rPr lang="en-US" dirty="0" smtClean="0"/>
+              <a:t>JavaScript / JQuery</a:t>
+            </a:r>
+            <a:endParaRPr lang="de-CH" dirty="0" smtClean="0"/>
           </a:p>
         </p:txBody>
       </p:sp>
@@ -3490,7 +3956,7 @@
 </p:sld>
 </file>
 
-<file path=ppt/slides/slide5.xml><?xml version="1.0" encoding="utf-8"?>
+<file path=ppt/slides/slide8.xml><?xml version="1.0" encoding="utf-8"?>
 <p:sld xmlns:a="http://schemas.openxmlformats.org/drawingml/2006/main" xmlns:r="http://schemas.openxmlformats.org/officeDocument/2006/relationships" xmlns:p="http://schemas.openxmlformats.org/presentationml/2006/main">
   <p:cSld>
     <p:spTree>
@@ -3548,14 +4014,6 @@
             <a:pPr marL="0" indent="0">
               <a:buNone/>
             </a:pPr>
-            <a:r>
-              <a:rPr lang="de-CH" dirty="0" err="1" smtClean="0"/>
-              <a:t>Fancy</a:t>
-            </a:r>
-            <a:r>
-              <a:rPr lang="de-CH" dirty="0" smtClean="0"/>
-              <a:t>!</a:t>
-            </a:r>
             <a:endParaRPr lang="de-CH" dirty="0"/>
           </a:p>
         </p:txBody>
@@ -3580,7 +4038,7 @@
 </p:sld>
 </file>
 
-<file path=ppt/slides/slide6.xml><?xml version="1.0" encoding="utf-8"?>
+<file path=ppt/slides/slide9.xml><?xml version="1.0" encoding="utf-8"?>
 <p:sld xmlns:a="http://schemas.openxmlformats.org/drawingml/2006/main" xmlns:r="http://schemas.openxmlformats.org/officeDocument/2006/relationships" xmlns:p="http://schemas.openxmlformats.org/presentationml/2006/main">
   <p:cSld>
     <p:spTree>
@@ -3891,141 +4349,6 @@
     <p:extLst>
       <p:ext uri="{BB962C8B-B14F-4D97-AF65-F5344CB8AC3E}">
         <p14:creationId xmlns:p14="http://schemas.microsoft.com/office/powerpoint/2010/main" val="1360827271"/>
-      </p:ext>
-    </p:extLst>
-  </p:cSld>
-  <p:clrMapOvr>
-    <a:masterClrMapping/>
-  </p:clrMapOvr>
-  <p:timing>
-    <p:tnLst>
-      <p:par>
-        <p:cTn id="1" dur="indefinite" restart="never" nodeType="tmRoot"/>
-      </p:par>
-    </p:tnLst>
-  </p:timing>
-</p:sld>
-</file>
-
-<file path=ppt/slides/slide7.xml><?xml version="1.0" encoding="utf-8"?>
-<p:sld xmlns:a="http://schemas.openxmlformats.org/drawingml/2006/main" xmlns:r="http://schemas.openxmlformats.org/officeDocument/2006/relationships" xmlns:p="http://schemas.openxmlformats.org/presentationml/2006/main">
-  <p:cSld>
-    <p:spTree>
-      <p:nvGrpSpPr>
-        <p:cNvPr id="1" name=""/>
-        <p:cNvGrpSpPr/>
-        <p:nvPr/>
-      </p:nvGrpSpPr>
-      <p:grpSpPr>
-        <a:xfrm>
-          <a:off x="0" y="0"/>
-          <a:ext cx="0" cy="0"/>
-          <a:chOff x="0" y="0"/>
-          <a:chExt cx="0" cy="0"/>
-        </a:xfrm>
-      </p:grpSpPr>
-      <p:sp>
-        <p:nvSpPr>
-          <p:cNvPr id="2" name="Title 1"/>
-          <p:cNvSpPr>
-            <a:spLocks noGrp="1"/>
-          </p:cNvSpPr>
-          <p:nvPr>
-            <p:ph type="title"/>
-          </p:nvPr>
-        </p:nvSpPr>
-        <p:spPr/>
-        <p:txBody>
-          <a:bodyPr/>
-          <a:lstStyle/>
-          <a:p>
-            <a:r>
-              <a:rPr lang="de-CH" dirty="0" err="1" smtClean="0"/>
-              <a:t>Conclusion</a:t>
-            </a:r>
-            <a:endParaRPr lang="de-CH" dirty="0"/>
-          </a:p>
-        </p:txBody>
-      </p:sp>
-      <p:sp>
-        <p:nvSpPr>
-          <p:cNvPr id="3" name="Content Placeholder 2"/>
-          <p:cNvSpPr>
-            <a:spLocks noGrp="1"/>
-          </p:cNvSpPr>
-          <p:nvPr>
-            <p:ph idx="1"/>
-          </p:nvPr>
-        </p:nvSpPr>
-        <p:spPr/>
-        <p:txBody>
-          <a:bodyPr/>
-          <a:lstStyle/>
-          <a:p>
-            <a:pPr marL="0" indent="0">
-              <a:buNone/>
-            </a:pPr>
-            <a:r>
-              <a:rPr lang="de-CH" dirty="0" smtClean="0"/>
-              <a:t>«Unterschätze die Arbeit nicht»</a:t>
-            </a:r>
-          </a:p>
-          <a:p>
-            <a:pPr marL="0" indent="0">
-              <a:buNone/>
-            </a:pPr>
-            <a:endParaRPr lang="de-CH" dirty="0" smtClean="0"/>
-          </a:p>
-          <a:p>
-            <a:endParaRPr lang="de-CH" dirty="0"/>
-          </a:p>
-        </p:txBody>
-      </p:sp>
-      <p:pic>
-        <p:nvPicPr>
-          <p:cNvPr id="2050" name="Picture 2" descr="https://fbcdn-sphotos-h-a.akamaihd.net/hphotos-ak-xpf1/v/t34.0-12/961531_10152997852023545_839001810_n.jpg?oh=5635c75abe4cbd1f09077d724a61bef5&amp;oe=54B0D8E2&amp;__gda__=1420880767_3b03b54b1c5c8e846661550cc92b2de1"/>
-          <p:cNvPicPr>
-            <a:picLocks noChangeAspect="1" noChangeArrowheads="1"/>
-          </p:cNvPicPr>
-          <p:nvPr/>
-        </p:nvPicPr>
-        <p:blipFill>
-          <a:blip r:embed="rId2">
-            <a:extLst>
-              <a:ext uri="{28A0092B-C50C-407E-A947-70E740481C1C}">
-                <a14:useLocalDpi xmlns:a14="http://schemas.microsoft.com/office/drawing/2010/main" val="0"/>
-              </a:ext>
-            </a:extLst>
-          </a:blip>
-          <a:srcRect/>
-          <a:stretch>
-            <a:fillRect/>
-          </a:stretch>
-        </p:blipFill>
-        <p:spPr bwMode="auto">
-          <a:xfrm>
-            <a:off x="305651" y="2555646"/>
-            <a:ext cx="11580697" cy="3250068"/>
-          </a:xfrm>
-          <a:prstGeom prst="rect">
-            <a:avLst/>
-          </a:prstGeom>
-          <a:noFill/>
-          <a:extLst>
-            <a:ext uri="{909E8E84-426E-40DD-AFC4-6F175D3DCCD1}">
-              <a14:hiddenFill xmlns:a14="http://schemas.microsoft.com/office/drawing/2010/main">
-                <a:solidFill>
-                  <a:srgbClr val="FFFFFF"/>
-                </a:solidFill>
-              </a14:hiddenFill>
-            </a:ext>
-          </a:extLst>
-        </p:spPr>
-      </p:pic>
-    </p:spTree>
-    <p:extLst>
-      <p:ext uri="{BB962C8B-B14F-4D97-AF65-F5344CB8AC3E}">
-        <p14:creationId xmlns:p14="http://schemas.microsoft.com/office/powerpoint/2010/main" val="3869012398"/>
       </p:ext>
     </p:extLst>
   </p:cSld>

</xml_diff>

<commit_message>
added latest print screen of commits
</commit_message>
<xml_diff>
--- a/ch.bfh.bti7054.w2014.p.pc-hammer/doc/PCHAMMER.pptx
+++ b/ch.bfh.bti7054.w2014.p.pc-hammer/doc/PCHAMMER.pptx
@@ -3374,6 +3374,13 @@
   <p:clrMapOvr>
     <a:masterClrMapping/>
   </p:clrMapOvr>
+  <p:timing>
+    <p:tnLst>
+      <p:par>
+        <p:cTn id="1" dur="indefinite" restart="never" nodeType="tmRoot"/>
+      </p:par>
+    </p:tnLst>
+  </p:timing>
 </p:sld>
 </file>
 
@@ -3453,7 +3460,7 @@
       </p:sp>
       <p:pic>
         <p:nvPicPr>
-          <p:cNvPr id="4" name="Picture 3"/>
+          <p:cNvPr id="6" name="Picture 5"/>
           <p:cNvPicPr>
             <a:picLocks noChangeAspect="1"/>
           </p:cNvPicPr>
@@ -3467,8 +3474,8 @@
         </p:blipFill>
         <p:spPr>
           <a:xfrm>
-            <a:off x="838200" y="2510351"/>
-            <a:ext cx="11057907" cy="3198470"/>
+            <a:off x="528637" y="2429669"/>
+            <a:ext cx="11134725" cy="3143250"/>
           </a:xfrm>
           <a:prstGeom prst="rect">
             <a:avLst/>
@@ -3678,14 +3685,21 @@
   <p:clrMapOvr>
     <a:masterClrMapping/>
   </p:clrMapOvr>
-  <mc:AlternateContent xmlns:mc="http://schemas.openxmlformats.org/markup-compatibility/2006">
-    <mc:Choice xmlns:p14="http://schemas.microsoft.com/office/powerpoint/2010/main" Requires="p14">
+  <mc:AlternateContent xmlns:mc="http://schemas.openxmlformats.org/markup-compatibility/2006" xmlns:p14="http://schemas.microsoft.com/office/powerpoint/2010/main">
+    <mc:Choice Requires="p14">
       <p:transition spd="slow" p14:dur="2000"/>
     </mc:Choice>
-    <mc:Fallback>
+    <mc:Fallback xmlns="">
       <p:transition spd="slow"/>
     </mc:Fallback>
   </mc:AlternateContent>
+  <p:timing>
+    <p:tnLst>
+      <p:par>
+        <p:cTn id="1" dur="indefinite" restart="never" nodeType="tmRoot"/>
+      </p:par>
+    </p:tnLst>
+  </p:timing>
 </p:sld>
 </file>
 
@@ -3782,6 +3796,13 @@
   <p:clrMapOvr>
     <a:masterClrMapping/>
   </p:clrMapOvr>
+  <p:timing>
+    <p:tnLst>
+      <p:par>
+        <p:cTn id="1" dur="indefinite" restart="never" nodeType="tmRoot"/>
+      </p:par>
+    </p:tnLst>
+  </p:timing>
 </p:sld>
 </file>
 
@@ -3891,14 +3912,21 @@
   <p:clrMapOvr>
     <a:masterClrMapping/>
   </p:clrMapOvr>
-  <mc:AlternateContent xmlns:mc="http://schemas.openxmlformats.org/markup-compatibility/2006">
-    <mc:Choice xmlns:p14="http://schemas.microsoft.com/office/powerpoint/2010/main" Requires="p14">
+  <mc:AlternateContent xmlns:mc="http://schemas.openxmlformats.org/markup-compatibility/2006" xmlns:p14="http://schemas.microsoft.com/office/powerpoint/2010/main">
+    <mc:Choice Requires="p14">
       <p:transition spd="slow" p14:dur="2000"/>
     </mc:Choice>
-    <mc:Fallback>
+    <mc:Fallback xmlns="">
       <p:transition spd="slow"/>
     </mc:Fallback>
   </mc:AlternateContent>
+  <p:timing>
+    <p:tnLst>
+      <p:par>
+        <p:cTn id="1" dur="indefinite" restart="never" nodeType="tmRoot"/>
+      </p:par>
+    </p:tnLst>
+  </p:timing>
 </p:sld>
 </file>
 
@@ -4069,11 +4097,7 @@
           <a:p>
             <a:r>
               <a:rPr lang="de-CH" dirty="0" smtClean="0"/>
-              <a:t>Database </a:t>
-            </a:r>
-            <a:r>
-              <a:rPr lang="de-CH" dirty="0" smtClean="0"/>
-              <a:t>Design</a:t>
+              <a:t>Database Design</a:t>
             </a:r>
           </a:p>
           <a:p>

</xml_diff>